<commit_message>
Recorded Demo Video, Edited PPT
</commit_message>
<xml_diff>
--- a/P2_LookingforGroupSynchronization/P2 - Looking for Group Synchronization.pptx
+++ b/P2_LookingforGroupSynchronization/P2 - Looking for Group Synchronization.pptx
@@ -8,6 +8,7 @@
     <p:sldId id="256" r:id="rId2"/>
     <p:sldId id="257" r:id="rId3"/>
     <p:sldId id="258" r:id="rId4"/>
+    <p:sldId id="259" r:id="rId5"/>
   </p:sldIdLst>
   <p:sldSz cx="12192000" cy="6858000"/>
   <p:notesSz cx="6858000" cy="9144000"/>
@@ -4531,6 +4532,96 @@
 </p:sld>
 </file>
 
+<file path=ppt/slides/slide4.xml><?xml version="1.0" encoding="utf-8"?>
+<p:sld xmlns:a="http://schemas.openxmlformats.org/drawingml/2006/main" xmlns:r="http://schemas.openxmlformats.org/officeDocument/2006/relationships" xmlns:p="http://schemas.openxmlformats.org/presentationml/2006/main">
+  <p:cSld>
+    <p:spTree>
+      <p:nvGrpSpPr>
+        <p:cNvPr id="1" name=""/>
+        <p:cNvGrpSpPr/>
+        <p:nvPr/>
+      </p:nvGrpSpPr>
+      <p:grpSpPr>
+        <a:xfrm>
+          <a:off x="0" y="0"/>
+          <a:ext cx="0" cy="0"/>
+          <a:chOff x="0" y="0"/>
+          <a:chExt cx="0" cy="0"/>
+        </a:xfrm>
+      </p:grpSpPr>
+      <p:sp>
+        <p:nvSpPr>
+          <p:cNvPr id="2" name="Title 1">
+            <a:extLst>
+              <a:ext uri="{FF2B5EF4-FFF2-40B4-BE49-F238E27FC236}">
+                <a16:creationId xmlns:a16="http://schemas.microsoft.com/office/drawing/2014/main" id="{5D349789-F577-6446-749D-8D7D2819D343}"/>
+              </a:ext>
+            </a:extLst>
+          </p:cNvPr>
+          <p:cNvSpPr>
+            <a:spLocks noGrp="1"/>
+          </p:cNvSpPr>
+          <p:nvPr>
+            <p:ph type="title"/>
+          </p:nvPr>
+        </p:nvSpPr>
+        <p:spPr/>
+        <p:txBody>
+          <a:bodyPr/>
+          <a:lstStyle/>
+          <a:p>
+            <a:r>
+              <a:rPr lang="en-US"/>
+              <a:t>Github</a:t>
+            </a:r>
+            <a:endParaRPr lang="en-PH"/>
+          </a:p>
+        </p:txBody>
+      </p:sp>
+      <p:sp>
+        <p:nvSpPr>
+          <p:cNvPr id="3" name="Text Placeholder 2">
+            <a:extLst>
+              <a:ext uri="{FF2B5EF4-FFF2-40B4-BE49-F238E27FC236}">
+                <a16:creationId xmlns:a16="http://schemas.microsoft.com/office/drawing/2014/main" id="{55010C1F-CE7D-C894-C7FD-A30231A74F25}"/>
+              </a:ext>
+            </a:extLst>
+          </p:cNvPr>
+          <p:cNvSpPr>
+            <a:spLocks noGrp="1"/>
+          </p:cNvSpPr>
+          <p:nvPr>
+            <p:ph type="body" idx="1"/>
+          </p:nvPr>
+        </p:nvSpPr>
+        <p:spPr/>
+        <p:txBody>
+          <a:bodyPr/>
+          <a:lstStyle/>
+          <a:p>
+            <a:r>
+              <a:rPr lang="en-PH">
+                <a:hlinkClick r:id="rId2"/>
+              </a:rPr>
+              <a:t>GitHub - KevTuco/STDISCM-P2</a:t>
+            </a:r>
+            <a:endParaRPr lang="en-PH"/>
+          </a:p>
+        </p:txBody>
+      </p:sp>
+    </p:spTree>
+    <p:extLst>
+      <p:ext uri="{BB962C8B-B14F-4D97-AF65-F5344CB8AC3E}">
+        <p14:creationId xmlns:p14="http://schemas.microsoft.com/office/powerpoint/2010/main" val="3263722627"/>
+      </p:ext>
+    </p:extLst>
+  </p:cSld>
+  <p:clrMapOvr>
+    <a:masterClrMapping/>
+  </p:clrMapOvr>
+</p:sld>
+</file>
+
 <file path=ppt/theme/theme1.xml><?xml version="1.0" encoding="utf-8"?>
 <a:theme xmlns:a="http://schemas.openxmlformats.org/drawingml/2006/main" name="Office Theme">
   <a:themeElements>

</xml_diff>